<commit_message>
image changed in ppt
an error in the code was visable
</commit_message>
<xml_diff>
--- a/example project/FTAS course/FTAS Course.pptx
+++ b/example project/FTAS course/FTAS Course.pptx
@@ -262,7 +262,7 @@
           <a:p>
             <a:fld id="{40BD410B-9EF6-4C98-A779-27B57C393D3D}" type="datetimeFigureOut">
               <a:rPr lang="nl-NL" smtClean="0"/>
-              <a:t>15-7-2015</a:t>
+              <a:t>16-7-2015</a:t>
             </a:fld>
             <a:endParaRPr lang="nl-NL"/>
           </a:p>
@@ -432,7 +432,7 @@
           <a:p>
             <a:fld id="{40BD410B-9EF6-4C98-A779-27B57C393D3D}" type="datetimeFigureOut">
               <a:rPr lang="nl-NL" smtClean="0"/>
-              <a:t>15-7-2015</a:t>
+              <a:t>16-7-2015</a:t>
             </a:fld>
             <a:endParaRPr lang="nl-NL"/>
           </a:p>
@@ -612,7 +612,7 @@
           <a:p>
             <a:fld id="{40BD410B-9EF6-4C98-A779-27B57C393D3D}" type="datetimeFigureOut">
               <a:rPr lang="nl-NL" smtClean="0"/>
-              <a:t>15-7-2015</a:t>
+              <a:t>16-7-2015</a:t>
             </a:fld>
             <a:endParaRPr lang="nl-NL"/>
           </a:p>
@@ -782,7 +782,7 @@
           <a:p>
             <a:fld id="{40BD410B-9EF6-4C98-A779-27B57C393D3D}" type="datetimeFigureOut">
               <a:rPr lang="nl-NL" smtClean="0"/>
-              <a:t>15-7-2015</a:t>
+              <a:t>16-7-2015</a:t>
             </a:fld>
             <a:endParaRPr lang="nl-NL"/>
           </a:p>
@@ -1028,7 +1028,7 @@
           <a:p>
             <a:fld id="{40BD410B-9EF6-4C98-A779-27B57C393D3D}" type="datetimeFigureOut">
               <a:rPr lang="nl-NL" smtClean="0"/>
-              <a:t>15-7-2015</a:t>
+              <a:t>16-7-2015</a:t>
             </a:fld>
             <a:endParaRPr lang="nl-NL"/>
           </a:p>
@@ -1260,7 +1260,7 @@
           <a:p>
             <a:fld id="{40BD410B-9EF6-4C98-A779-27B57C393D3D}" type="datetimeFigureOut">
               <a:rPr lang="nl-NL" smtClean="0"/>
-              <a:t>15-7-2015</a:t>
+              <a:t>16-7-2015</a:t>
             </a:fld>
             <a:endParaRPr lang="nl-NL"/>
           </a:p>
@@ -1627,7 +1627,7 @@
           <a:p>
             <a:fld id="{40BD410B-9EF6-4C98-A779-27B57C393D3D}" type="datetimeFigureOut">
               <a:rPr lang="nl-NL" smtClean="0"/>
-              <a:t>15-7-2015</a:t>
+              <a:t>16-7-2015</a:t>
             </a:fld>
             <a:endParaRPr lang="nl-NL"/>
           </a:p>
@@ -1745,7 +1745,7 @@
           <a:p>
             <a:fld id="{40BD410B-9EF6-4C98-A779-27B57C393D3D}" type="datetimeFigureOut">
               <a:rPr lang="nl-NL" smtClean="0"/>
-              <a:t>15-7-2015</a:t>
+              <a:t>16-7-2015</a:t>
             </a:fld>
             <a:endParaRPr lang="nl-NL"/>
           </a:p>
@@ -1840,7 +1840,7 @@
           <a:p>
             <a:fld id="{40BD410B-9EF6-4C98-A779-27B57C393D3D}" type="datetimeFigureOut">
               <a:rPr lang="nl-NL" smtClean="0"/>
-              <a:t>15-7-2015</a:t>
+              <a:t>16-7-2015</a:t>
             </a:fld>
             <a:endParaRPr lang="nl-NL"/>
           </a:p>
@@ -2117,7 +2117,7 @@
           <a:p>
             <a:fld id="{40BD410B-9EF6-4C98-A779-27B57C393D3D}" type="datetimeFigureOut">
               <a:rPr lang="nl-NL" smtClean="0"/>
-              <a:t>15-7-2015</a:t>
+              <a:t>16-7-2015</a:t>
             </a:fld>
             <a:endParaRPr lang="nl-NL"/>
           </a:p>
@@ -2370,7 +2370,7 @@
           <a:p>
             <a:fld id="{40BD410B-9EF6-4C98-A779-27B57C393D3D}" type="datetimeFigureOut">
               <a:rPr lang="nl-NL" smtClean="0"/>
-              <a:t>15-7-2015</a:t>
+              <a:t>16-7-2015</a:t>
             </a:fld>
             <a:endParaRPr lang="nl-NL"/>
           </a:p>
@@ -2583,7 +2583,7 @@
           <a:p>
             <a:fld id="{40BD410B-9EF6-4C98-A779-27B57C393D3D}" type="datetimeFigureOut">
               <a:rPr lang="nl-NL" smtClean="0"/>
-              <a:t>15-7-2015</a:t>
+              <a:t>16-7-2015</a:t>
             </a:fld>
             <a:endParaRPr lang="nl-NL"/>
           </a:p>
@@ -3229,15 +3229,35 @@
           </a:p>
         </p:txBody>
       </p:sp>
+      <p:sp>
+        <p:nvSpPr>
+          <p:cNvPr id="3" name="Content Placeholder 2"/>
+          <p:cNvSpPr>
+            <a:spLocks noGrp="1"/>
+          </p:cNvSpPr>
+          <p:nvPr>
+            <p:ph idx="1"/>
+          </p:nvPr>
+        </p:nvSpPr>
+        <p:spPr/>
+        <p:txBody>
+          <a:bodyPr/>
+          <a:lstStyle/>
+          <a:p>
+            <a:pPr marL="0" indent="0">
+              <a:buNone/>
+            </a:pPr>
+            <a:endParaRPr lang="nl-NL" dirty="0"/>
+          </a:p>
+        </p:txBody>
+      </p:sp>
       <p:pic>
         <p:nvPicPr>
-          <p:cNvPr id="4" name="Content Placeholder 3"/>
+          <p:cNvPr id="6" name="Picture 5"/>
           <p:cNvPicPr>
-            <a:picLocks noGrp="1" noChangeAspect="1"/>
+            <a:picLocks noChangeAspect="1"/>
           </p:cNvPicPr>
-          <p:nvPr>
-            <p:ph idx="1"/>
-          </p:nvPr>
+          <p:nvPr/>
         </p:nvPicPr>
         <p:blipFill>
           <a:blip r:embed="rId2"/>
@@ -3247,8 +3267,8 @@
         </p:blipFill>
         <p:spPr>
           <a:xfrm>
-            <a:off x="3864990" y="1363240"/>
-            <a:ext cx="4600280" cy="5439591"/>
+            <a:off x="4007939" y="1460508"/>
+            <a:ext cx="4176122" cy="4839119"/>
           </a:xfrm>
           <a:prstGeom prst="rect">
             <a:avLst/>
@@ -5362,11 +5382,7 @@
             </a:r>
             <a:r>
               <a:rPr lang="nl-NL" dirty="0" smtClean="0"/>
-              <a:t> </a:t>
-            </a:r>
-            <a:r>
-              <a:rPr lang="nl-NL" dirty="0" smtClean="0"/>
-              <a:t>scripts</a:t>
+              <a:t> scripts</a:t>
             </a:r>
           </a:p>
           <a:p>
@@ -5391,7 +5407,6 @@
               <a:rPr lang="nl-NL" dirty="0" smtClean="0"/>
               <a:t>)</a:t>
             </a:r>
-            <a:endParaRPr lang="nl-NL" dirty="0" smtClean="0"/>
           </a:p>
           <a:p>
             <a:pPr lvl="1"/>

</xml_diff>